<commit_message>
Adding cheats, and some "refactoring".
</commit_message>
<xml_diff>
--- a/presentations/venue/czegenyi_roland/prezi_JAVA_EE_czegenyi_roland.pptx
+++ b/presentations/venue/czegenyi_roland/prezi_JAVA_EE_czegenyi_roland.pptx
@@ -4,6 +4,9 @@
   <p:sldMasterIdLst>
     <p:sldMasterId id="2147483660" r:id="rId4"/>
   </p:sldMasterIdLst>
+  <p:notesMasterIdLst>
+    <p:notesMasterId r:id="rId12"/>
+  </p:notesMasterIdLst>
   <p:sldIdLst>
     <p:sldId id="257" r:id="rId5"/>
     <p:sldId id="256" r:id="rId6"/>
@@ -129,6 +132,1215 @@
 </p:presentation>
 </file>
 
+<file path=ppt/notesMasters/notesMaster1.xml><?xml version="1.0" encoding="utf-8"?>
+<p:notesMaster xmlns:a="http://schemas.openxmlformats.org/drawingml/2006/main" xmlns:r="http://schemas.openxmlformats.org/officeDocument/2006/relationships" xmlns:p="http://schemas.openxmlformats.org/presentationml/2006/main">
+  <p:cSld>
+    <p:bg>
+      <p:bgRef idx="1001">
+        <a:schemeClr val="bg1"/>
+      </p:bgRef>
+    </p:bg>
+    <p:spTree>
+      <p:nvGrpSpPr>
+        <p:cNvPr id="1" name=""/>
+        <p:cNvGrpSpPr/>
+        <p:nvPr/>
+      </p:nvGrpSpPr>
+      <p:grpSpPr>
+        <a:xfrm>
+          <a:off x="0" y="0"/>
+          <a:ext cx="0" cy="0"/>
+          <a:chOff x="0" y="0"/>
+          <a:chExt cx="0" cy="0"/>
+        </a:xfrm>
+      </p:grpSpPr>
+      <p:sp>
+        <p:nvSpPr>
+          <p:cNvPr id="2" name="Élőfej helye 1"/>
+          <p:cNvSpPr>
+            <a:spLocks noGrp="1"/>
+          </p:cNvSpPr>
+          <p:nvPr>
+            <p:ph type="hdr" sz="quarter"/>
+          </p:nvPr>
+        </p:nvSpPr>
+        <p:spPr>
+          <a:xfrm>
+            <a:off x="0" y="0"/>
+            <a:ext cx="2971800" cy="457200"/>
+          </a:xfrm>
+          <a:prstGeom prst="rect">
+            <a:avLst/>
+          </a:prstGeom>
+        </p:spPr>
+        <p:txBody>
+          <a:bodyPr vert="horz" lIns="91440" tIns="45720" rIns="91440" bIns="45720" rtlCol="0"/>
+          <a:lstStyle>
+            <a:lvl1pPr algn="l">
+              <a:defRPr sz="1200"/>
+            </a:lvl1pPr>
+          </a:lstStyle>
+          <a:p>
+            <a:endParaRPr lang="hu-HU"/>
+          </a:p>
+        </p:txBody>
+      </p:sp>
+      <p:sp>
+        <p:nvSpPr>
+          <p:cNvPr id="3" name="Dátum helye 2"/>
+          <p:cNvSpPr>
+            <a:spLocks noGrp="1"/>
+          </p:cNvSpPr>
+          <p:nvPr>
+            <p:ph type="dt" idx="1"/>
+          </p:nvPr>
+        </p:nvSpPr>
+        <p:spPr>
+          <a:xfrm>
+            <a:off x="3884613" y="0"/>
+            <a:ext cx="2971800" cy="457200"/>
+          </a:xfrm>
+          <a:prstGeom prst="rect">
+            <a:avLst/>
+          </a:prstGeom>
+        </p:spPr>
+        <p:txBody>
+          <a:bodyPr vert="horz" lIns="91440" tIns="45720" rIns="91440" bIns="45720" rtlCol="0"/>
+          <a:lstStyle>
+            <a:lvl1pPr algn="r">
+              <a:defRPr sz="1200"/>
+            </a:lvl1pPr>
+          </a:lstStyle>
+          <a:p>
+            <a:fld id="{63A5692E-7333-4380-85D5-EB807BCA1FE2}" type="datetimeFigureOut">
+              <a:rPr lang="hu-HU" smtClean="0"/>
+              <a:t>2016. 10. 03.</a:t>
+            </a:fld>
+            <a:endParaRPr lang="hu-HU"/>
+          </a:p>
+        </p:txBody>
+      </p:sp>
+      <p:sp>
+        <p:nvSpPr>
+          <p:cNvPr id="4" name="Diakép helye 3"/>
+          <p:cNvSpPr>
+            <a:spLocks noGrp="1" noRot="1" noChangeAspect="1"/>
+          </p:cNvSpPr>
+          <p:nvPr>
+            <p:ph type="sldImg" idx="2"/>
+          </p:nvPr>
+        </p:nvSpPr>
+        <p:spPr>
+          <a:xfrm>
+            <a:off x="381000" y="685800"/>
+            <a:ext cx="6096000" cy="3429000"/>
+          </a:xfrm>
+          <a:prstGeom prst="rect">
+            <a:avLst/>
+          </a:prstGeom>
+          <a:noFill/>
+          <a:ln w="12700">
+            <a:solidFill>
+              <a:prstClr val="black"/>
+            </a:solidFill>
+          </a:ln>
+        </p:spPr>
+        <p:txBody>
+          <a:bodyPr vert="horz" lIns="91440" tIns="45720" rIns="91440" bIns="45720" rtlCol="0" anchor="ctr"/>
+          <a:lstStyle/>
+          <a:p>
+            <a:endParaRPr lang="hu-HU"/>
+          </a:p>
+        </p:txBody>
+      </p:sp>
+      <p:sp>
+        <p:nvSpPr>
+          <p:cNvPr id="5" name="Jegyzetek helye 4"/>
+          <p:cNvSpPr>
+            <a:spLocks noGrp="1"/>
+          </p:cNvSpPr>
+          <p:nvPr>
+            <p:ph type="body" sz="quarter" idx="3"/>
+          </p:nvPr>
+        </p:nvSpPr>
+        <p:spPr>
+          <a:xfrm>
+            <a:off x="685800" y="4343400"/>
+            <a:ext cx="5486400" cy="4114800"/>
+          </a:xfrm>
+          <a:prstGeom prst="rect">
+            <a:avLst/>
+          </a:prstGeom>
+        </p:spPr>
+        <p:txBody>
+          <a:bodyPr vert="horz" lIns="91440" tIns="45720" rIns="91440" bIns="45720" rtlCol="0"/>
+          <a:lstStyle/>
+          <a:p>
+            <a:pPr lvl="0"/>
+            <a:r>
+              <a:rPr lang="hu-HU" smtClean="0"/>
+              <a:t>Mintaszöveg szerkesztése</a:t>
+            </a:r>
+          </a:p>
+          <a:p>
+            <a:pPr lvl="1"/>
+            <a:r>
+              <a:rPr lang="hu-HU" smtClean="0"/>
+              <a:t>Második szint</a:t>
+            </a:r>
+          </a:p>
+          <a:p>
+            <a:pPr lvl="2"/>
+            <a:r>
+              <a:rPr lang="hu-HU" smtClean="0"/>
+              <a:t>Harmadik szint</a:t>
+            </a:r>
+          </a:p>
+          <a:p>
+            <a:pPr lvl="3"/>
+            <a:r>
+              <a:rPr lang="hu-HU" smtClean="0"/>
+              <a:t>Negyedik szint</a:t>
+            </a:r>
+          </a:p>
+          <a:p>
+            <a:pPr lvl="4"/>
+            <a:r>
+              <a:rPr lang="hu-HU" smtClean="0"/>
+              <a:t>Ötödik szint</a:t>
+            </a:r>
+            <a:endParaRPr lang="hu-HU"/>
+          </a:p>
+        </p:txBody>
+      </p:sp>
+      <p:sp>
+        <p:nvSpPr>
+          <p:cNvPr id="6" name="Élőláb helye 5"/>
+          <p:cNvSpPr>
+            <a:spLocks noGrp="1"/>
+          </p:cNvSpPr>
+          <p:nvPr>
+            <p:ph type="ftr" sz="quarter" idx="4"/>
+          </p:nvPr>
+        </p:nvSpPr>
+        <p:spPr>
+          <a:xfrm>
+            <a:off x="0" y="8685213"/>
+            <a:ext cx="2971800" cy="457200"/>
+          </a:xfrm>
+          <a:prstGeom prst="rect">
+            <a:avLst/>
+          </a:prstGeom>
+        </p:spPr>
+        <p:txBody>
+          <a:bodyPr vert="horz" lIns="91440" tIns="45720" rIns="91440" bIns="45720" rtlCol="0" anchor="b"/>
+          <a:lstStyle>
+            <a:lvl1pPr algn="l">
+              <a:defRPr sz="1200"/>
+            </a:lvl1pPr>
+          </a:lstStyle>
+          <a:p>
+            <a:endParaRPr lang="hu-HU"/>
+          </a:p>
+        </p:txBody>
+      </p:sp>
+      <p:sp>
+        <p:nvSpPr>
+          <p:cNvPr id="7" name="Dia számának helye 6"/>
+          <p:cNvSpPr>
+            <a:spLocks noGrp="1"/>
+          </p:cNvSpPr>
+          <p:nvPr>
+            <p:ph type="sldNum" sz="quarter" idx="5"/>
+          </p:nvPr>
+        </p:nvSpPr>
+        <p:spPr>
+          <a:xfrm>
+            <a:off x="3884613" y="8685213"/>
+            <a:ext cx="2971800" cy="457200"/>
+          </a:xfrm>
+          <a:prstGeom prst="rect">
+            <a:avLst/>
+          </a:prstGeom>
+        </p:spPr>
+        <p:txBody>
+          <a:bodyPr vert="horz" lIns="91440" tIns="45720" rIns="91440" bIns="45720" rtlCol="0" anchor="b"/>
+          <a:lstStyle>
+            <a:lvl1pPr algn="r">
+              <a:defRPr sz="1200"/>
+            </a:lvl1pPr>
+          </a:lstStyle>
+          <a:p>
+            <a:fld id="{9FAC7F36-1C04-4816-80C8-90F28C90A98F}" type="slidenum">
+              <a:rPr lang="hu-HU" smtClean="0"/>
+              <a:t>‹#›</a:t>
+            </a:fld>
+            <a:endParaRPr lang="hu-HU"/>
+          </a:p>
+        </p:txBody>
+      </p:sp>
+    </p:spTree>
+    <p:extLst>
+      <p:ext uri="{BB962C8B-B14F-4D97-AF65-F5344CB8AC3E}">
+        <p14:creationId xmlns:p14="http://schemas.microsoft.com/office/powerpoint/2010/main" val="1823372618"/>
+      </p:ext>
+    </p:extLst>
+  </p:cSld>
+  <p:clrMap bg1="lt1" tx1="dk1" bg2="lt2" tx2="dk2" accent1="accent1" accent2="accent2" accent3="accent3" accent4="accent4" accent5="accent5" accent6="accent6" hlink="hlink" folHlink="folHlink"/>
+  <p:notesStyle>
+    <a:lvl1pPr marL="0" algn="l" defTabSz="914400" rtl="0" eaLnBrk="1" latinLnBrk="0" hangingPunct="1">
+      <a:defRPr sz="1200" kern="1200">
+        <a:solidFill>
+          <a:schemeClr val="tx1"/>
+        </a:solidFill>
+        <a:latin typeface="+mn-lt"/>
+        <a:ea typeface="+mn-ea"/>
+        <a:cs typeface="+mn-cs"/>
+      </a:defRPr>
+    </a:lvl1pPr>
+    <a:lvl2pPr marL="457200" algn="l" defTabSz="914400" rtl="0" eaLnBrk="1" latinLnBrk="0" hangingPunct="1">
+      <a:defRPr sz="1200" kern="1200">
+        <a:solidFill>
+          <a:schemeClr val="tx1"/>
+        </a:solidFill>
+        <a:latin typeface="+mn-lt"/>
+        <a:ea typeface="+mn-ea"/>
+        <a:cs typeface="+mn-cs"/>
+      </a:defRPr>
+    </a:lvl2pPr>
+    <a:lvl3pPr marL="914400" algn="l" defTabSz="914400" rtl="0" eaLnBrk="1" latinLnBrk="0" hangingPunct="1">
+      <a:defRPr sz="1200" kern="1200">
+        <a:solidFill>
+          <a:schemeClr val="tx1"/>
+        </a:solidFill>
+        <a:latin typeface="+mn-lt"/>
+        <a:ea typeface="+mn-ea"/>
+        <a:cs typeface="+mn-cs"/>
+      </a:defRPr>
+    </a:lvl3pPr>
+    <a:lvl4pPr marL="1371600" algn="l" defTabSz="914400" rtl="0" eaLnBrk="1" latinLnBrk="0" hangingPunct="1">
+      <a:defRPr sz="1200" kern="1200">
+        <a:solidFill>
+          <a:schemeClr val="tx1"/>
+        </a:solidFill>
+        <a:latin typeface="+mn-lt"/>
+        <a:ea typeface="+mn-ea"/>
+        <a:cs typeface="+mn-cs"/>
+      </a:defRPr>
+    </a:lvl4pPr>
+    <a:lvl5pPr marL="1828800" algn="l" defTabSz="914400" rtl="0" eaLnBrk="1" latinLnBrk="0" hangingPunct="1">
+      <a:defRPr sz="1200" kern="1200">
+        <a:solidFill>
+          <a:schemeClr val="tx1"/>
+        </a:solidFill>
+        <a:latin typeface="+mn-lt"/>
+        <a:ea typeface="+mn-ea"/>
+        <a:cs typeface="+mn-cs"/>
+      </a:defRPr>
+    </a:lvl5pPr>
+    <a:lvl6pPr marL="2286000" algn="l" defTabSz="914400" rtl="0" eaLnBrk="1" latinLnBrk="0" hangingPunct="1">
+      <a:defRPr sz="1200" kern="1200">
+        <a:solidFill>
+          <a:schemeClr val="tx1"/>
+        </a:solidFill>
+        <a:latin typeface="+mn-lt"/>
+        <a:ea typeface="+mn-ea"/>
+        <a:cs typeface="+mn-cs"/>
+      </a:defRPr>
+    </a:lvl6pPr>
+    <a:lvl7pPr marL="2743200" algn="l" defTabSz="914400" rtl="0" eaLnBrk="1" latinLnBrk="0" hangingPunct="1">
+      <a:defRPr sz="1200" kern="1200">
+        <a:solidFill>
+          <a:schemeClr val="tx1"/>
+        </a:solidFill>
+        <a:latin typeface="+mn-lt"/>
+        <a:ea typeface="+mn-ea"/>
+        <a:cs typeface="+mn-cs"/>
+      </a:defRPr>
+    </a:lvl7pPr>
+    <a:lvl8pPr marL="3200400" algn="l" defTabSz="914400" rtl="0" eaLnBrk="1" latinLnBrk="0" hangingPunct="1">
+      <a:defRPr sz="1200" kern="1200">
+        <a:solidFill>
+          <a:schemeClr val="tx1"/>
+        </a:solidFill>
+        <a:latin typeface="+mn-lt"/>
+        <a:ea typeface="+mn-ea"/>
+        <a:cs typeface="+mn-cs"/>
+      </a:defRPr>
+    </a:lvl8pPr>
+    <a:lvl9pPr marL="3657600" algn="l" defTabSz="914400" rtl="0" eaLnBrk="1" latinLnBrk="0" hangingPunct="1">
+      <a:defRPr sz="1200" kern="1200">
+        <a:solidFill>
+          <a:schemeClr val="tx1"/>
+        </a:solidFill>
+        <a:latin typeface="+mn-lt"/>
+        <a:ea typeface="+mn-ea"/>
+        <a:cs typeface="+mn-cs"/>
+      </a:defRPr>
+    </a:lvl9pPr>
+  </p:notesStyle>
+</p:notesMaster>
+</file>
+
+<file path=ppt/notesSlides/notesSlide1.xml><?xml version="1.0" encoding="utf-8"?>
+<p:notes xmlns:a="http://schemas.openxmlformats.org/drawingml/2006/main" xmlns:r="http://schemas.openxmlformats.org/officeDocument/2006/relationships" xmlns:p="http://schemas.openxmlformats.org/presentationml/2006/main">
+  <p:cSld>
+    <p:spTree>
+      <p:nvGrpSpPr>
+        <p:cNvPr id="1" name=""/>
+        <p:cNvGrpSpPr/>
+        <p:nvPr/>
+      </p:nvGrpSpPr>
+      <p:grpSpPr>
+        <a:xfrm>
+          <a:off x="0" y="0"/>
+          <a:ext cx="0" cy="0"/>
+          <a:chOff x="0" y="0"/>
+          <a:chExt cx="0" cy="0"/>
+        </a:xfrm>
+      </p:grpSpPr>
+      <p:sp>
+        <p:nvSpPr>
+          <p:cNvPr id="2" name="Diakép helye 1"/>
+          <p:cNvSpPr>
+            <a:spLocks noGrp="1" noRot="1" noChangeAspect="1"/>
+          </p:cNvSpPr>
+          <p:nvPr>
+            <p:ph type="sldImg"/>
+          </p:nvPr>
+        </p:nvSpPr>
+        <p:spPr/>
+      </p:sp>
+      <p:sp>
+        <p:nvSpPr>
+          <p:cNvPr id="3" name="Jegyzetek helye 2"/>
+          <p:cNvSpPr>
+            <a:spLocks noGrp="1"/>
+          </p:cNvSpPr>
+          <p:nvPr>
+            <p:ph type="body" idx="1"/>
+          </p:nvPr>
+        </p:nvSpPr>
+        <p:spPr/>
+        <p:txBody>
+          <a:bodyPr/>
+          <a:lstStyle/>
+          <a:p>
+            <a:endParaRPr lang="hu-HU" dirty="0"/>
+          </a:p>
+        </p:txBody>
+      </p:sp>
+      <p:sp>
+        <p:nvSpPr>
+          <p:cNvPr id="4" name="Dia számának helye 3"/>
+          <p:cNvSpPr>
+            <a:spLocks noGrp="1"/>
+          </p:cNvSpPr>
+          <p:nvPr>
+            <p:ph type="sldNum" sz="quarter" idx="10"/>
+          </p:nvPr>
+        </p:nvSpPr>
+        <p:spPr/>
+        <p:txBody>
+          <a:bodyPr/>
+          <a:lstStyle/>
+          <a:p>
+            <a:fld id="{9FAC7F36-1C04-4816-80C8-90F28C90A98F}" type="slidenum">
+              <a:rPr lang="hu-HU" smtClean="0"/>
+              <a:t>1</a:t>
+            </a:fld>
+            <a:endParaRPr lang="hu-HU" dirty="0"/>
+          </a:p>
+        </p:txBody>
+      </p:sp>
+    </p:spTree>
+    <p:extLst>
+      <p:ext uri="{BB962C8B-B14F-4D97-AF65-F5344CB8AC3E}">
+        <p14:creationId xmlns:p14="http://schemas.microsoft.com/office/powerpoint/2010/main" val="2837736345"/>
+      </p:ext>
+    </p:extLst>
+  </p:cSld>
+  <p:clrMapOvr>
+    <a:masterClrMapping/>
+  </p:clrMapOvr>
+</p:notes>
+</file>
+
+<file path=ppt/notesSlides/notesSlide2.xml><?xml version="1.0" encoding="utf-8"?>
+<p:notes xmlns:a="http://schemas.openxmlformats.org/drawingml/2006/main" xmlns:r="http://schemas.openxmlformats.org/officeDocument/2006/relationships" xmlns:p="http://schemas.openxmlformats.org/presentationml/2006/main">
+  <p:cSld>
+    <p:spTree>
+      <p:nvGrpSpPr>
+        <p:cNvPr id="1" name=""/>
+        <p:cNvGrpSpPr/>
+        <p:nvPr/>
+      </p:nvGrpSpPr>
+      <p:grpSpPr>
+        <a:xfrm>
+          <a:off x="0" y="0"/>
+          <a:ext cx="0" cy="0"/>
+          <a:chOff x="0" y="0"/>
+          <a:chExt cx="0" cy="0"/>
+        </a:xfrm>
+      </p:grpSpPr>
+      <p:sp>
+        <p:nvSpPr>
+          <p:cNvPr id="2" name="Diakép helye 1"/>
+          <p:cNvSpPr>
+            <a:spLocks noGrp="1" noRot="1" noChangeAspect="1"/>
+          </p:cNvSpPr>
+          <p:nvPr>
+            <p:ph type="sldImg"/>
+          </p:nvPr>
+        </p:nvSpPr>
+        <p:spPr/>
+      </p:sp>
+      <p:sp>
+        <p:nvSpPr>
+          <p:cNvPr id="3" name="Jegyzetek helye 2"/>
+          <p:cNvSpPr>
+            <a:spLocks noGrp="1"/>
+          </p:cNvSpPr>
+          <p:nvPr>
+            <p:ph type="body" idx="1"/>
+          </p:nvPr>
+        </p:nvSpPr>
+        <p:spPr/>
+        <p:txBody>
+          <a:bodyPr/>
+          <a:lstStyle/>
+          <a:p>
+            <a:r>
+              <a:rPr lang="hu-HU" dirty="0" smtClean="0"/>
+              <a:t>Jó estét kívánok</a:t>
+            </a:r>
+            <a:r>
+              <a:rPr lang="en-US" dirty="0" smtClean="0"/>
+              <a:t>!</a:t>
+            </a:r>
+          </a:p>
+          <a:p>
+            <a:r>
+              <a:rPr lang="hu-HU" dirty="0" err="1" smtClean="0"/>
+              <a:t>Czégényi</a:t>
+            </a:r>
+            <a:r>
+              <a:rPr lang="hu-HU" baseline="0" dirty="0" smtClean="0"/>
+              <a:t> Roland vagyok, a Debreceni Egyetem informatika karának hallgatója, </a:t>
+            </a:r>
+            <a:r>
+              <a:rPr lang="hu-HU" baseline="0" dirty="0" err="1" smtClean="0"/>
+              <a:t>pti</a:t>
+            </a:r>
+            <a:r>
+              <a:rPr lang="hu-HU" baseline="0" dirty="0" smtClean="0"/>
+              <a:t> szakon.</a:t>
+            </a:r>
+          </a:p>
+          <a:p>
+            <a:r>
+              <a:rPr lang="hu-HU" baseline="0" dirty="0" smtClean="0"/>
+              <a:t>Mint a közvetlenül előttem szólók én is a </a:t>
+            </a:r>
+            <a:r>
+              <a:rPr lang="hu-HU" baseline="0" dirty="0" err="1" smtClean="0"/>
+              <a:t>venue</a:t>
+            </a:r>
+            <a:r>
+              <a:rPr lang="hu-HU" baseline="0" dirty="0" smtClean="0"/>
+              <a:t> csoport tagja voltam.</a:t>
+            </a:r>
+            <a:endParaRPr lang="hu-HU" dirty="0"/>
+          </a:p>
+        </p:txBody>
+      </p:sp>
+      <p:sp>
+        <p:nvSpPr>
+          <p:cNvPr id="4" name="Dia számának helye 3"/>
+          <p:cNvSpPr>
+            <a:spLocks noGrp="1"/>
+          </p:cNvSpPr>
+          <p:nvPr>
+            <p:ph type="sldNum" sz="quarter" idx="10"/>
+          </p:nvPr>
+        </p:nvSpPr>
+        <p:spPr/>
+        <p:txBody>
+          <a:bodyPr/>
+          <a:lstStyle/>
+          <a:p>
+            <a:fld id="{9FAC7F36-1C04-4816-80C8-90F28C90A98F}" type="slidenum">
+              <a:rPr lang="hu-HU" smtClean="0"/>
+              <a:t>2</a:t>
+            </a:fld>
+            <a:endParaRPr lang="hu-HU"/>
+          </a:p>
+        </p:txBody>
+      </p:sp>
+    </p:spTree>
+    <p:extLst>
+      <p:ext uri="{BB962C8B-B14F-4D97-AF65-F5344CB8AC3E}">
+        <p14:creationId xmlns:p14="http://schemas.microsoft.com/office/powerpoint/2010/main" val="2828279974"/>
+      </p:ext>
+    </p:extLst>
+  </p:cSld>
+  <p:clrMapOvr>
+    <a:masterClrMapping/>
+  </p:clrMapOvr>
+</p:notes>
+</file>
+
+<file path=ppt/notesSlides/notesSlide3.xml><?xml version="1.0" encoding="utf-8"?>
+<p:notes xmlns:a="http://schemas.openxmlformats.org/drawingml/2006/main" xmlns:r="http://schemas.openxmlformats.org/officeDocument/2006/relationships" xmlns:p="http://schemas.openxmlformats.org/presentationml/2006/main">
+  <p:cSld>
+    <p:spTree>
+      <p:nvGrpSpPr>
+        <p:cNvPr id="1" name=""/>
+        <p:cNvGrpSpPr/>
+        <p:nvPr/>
+      </p:nvGrpSpPr>
+      <p:grpSpPr>
+        <a:xfrm>
+          <a:off x="0" y="0"/>
+          <a:ext cx="0" cy="0"/>
+          <a:chOff x="0" y="0"/>
+          <a:chExt cx="0" cy="0"/>
+        </a:xfrm>
+      </p:grpSpPr>
+      <p:sp>
+        <p:nvSpPr>
+          <p:cNvPr id="2" name="Diakép helye 1"/>
+          <p:cNvSpPr>
+            <a:spLocks noGrp="1" noRot="1" noChangeAspect="1"/>
+          </p:cNvSpPr>
+          <p:nvPr>
+            <p:ph type="sldImg"/>
+          </p:nvPr>
+        </p:nvSpPr>
+        <p:spPr/>
+      </p:sp>
+      <p:sp>
+        <p:nvSpPr>
+          <p:cNvPr id="3" name="Jegyzetek helye 2"/>
+          <p:cNvSpPr>
+            <a:spLocks noGrp="1"/>
+          </p:cNvSpPr>
+          <p:nvPr>
+            <p:ph type="body" idx="1"/>
+          </p:nvPr>
+        </p:nvSpPr>
+        <p:spPr/>
+        <p:txBody>
+          <a:bodyPr/>
+          <a:lstStyle/>
+          <a:p>
+            <a:r>
+              <a:rPr lang="hu-HU" dirty="0" smtClean="0"/>
+              <a:t>Ami tevékenységeimet illeti, kezdetben a service és </a:t>
+            </a:r>
+            <a:r>
+              <a:rPr lang="hu-HU" dirty="0" err="1" smtClean="0"/>
+              <a:t>Vo</a:t>
+            </a:r>
+            <a:r>
+              <a:rPr lang="hu-HU" dirty="0" smtClean="0"/>
+              <a:t> réteg megvalósításával foglalkoztam, mely nem hangzik túl</a:t>
+            </a:r>
+            <a:r>
+              <a:rPr lang="hu-HU" baseline="0" dirty="0" smtClean="0"/>
+              <a:t> izgalmasnak, de fontos része az alkalmazásnak, hisz úgy mondva közvetít az adatbázis réteg és a megjelenítés között, itt megemlíteném, hogy számomra érdekes volt ezen feladat megvalósítása során, hogy függtem valakitől</a:t>
+            </a:r>
+            <a:r>
+              <a:rPr lang="en-US" baseline="0" dirty="0" smtClean="0"/>
+              <a:t>(</a:t>
+            </a:r>
+            <a:r>
+              <a:rPr lang="en-US" baseline="0" dirty="0" err="1" smtClean="0"/>
+              <a:t>db</a:t>
+            </a:r>
+            <a:r>
+              <a:rPr lang="hu-HU" baseline="0" dirty="0" smtClean="0"/>
+              <a:t>.</a:t>
+            </a:r>
+            <a:r>
+              <a:rPr lang="en-US" baseline="0" dirty="0" smtClean="0"/>
+              <a:t> r</a:t>
+            </a:r>
+            <a:r>
+              <a:rPr lang="hu-HU" baseline="0" dirty="0" err="1" smtClean="0"/>
+              <a:t>éteg</a:t>
+            </a:r>
+            <a:r>
+              <a:rPr lang="en-US" baseline="0" dirty="0" smtClean="0"/>
+              <a:t>)</a:t>
+            </a:r>
+            <a:r>
+              <a:rPr lang="hu-HU" baseline="0" dirty="0" smtClean="0"/>
+              <a:t>, és tőlem is függött valaki, ez számomra új élmény volt, hisz eddig nem dolgoztam csapatban, és hozzá voltam szokva, hogy mindent egyedül csinálok, </a:t>
+            </a:r>
+          </a:p>
+          <a:p>
+            <a:r>
+              <a:rPr lang="hu-HU" baseline="0" dirty="0" smtClean="0"/>
+              <a:t>Nehézségeket ez nem okozott, mivel ha valamire még szükség volt, esetleg másféle megvalósítást igényelt, arról egyből kaptam a visszajelzést a csapattársaktól, és persze én is adtam ha indokolt volt.</a:t>
+            </a:r>
+          </a:p>
+          <a:p>
+            <a:r>
+              <a:rPr lang="hu-HU" baseline="0" dirty="0" smtClean="0"/>
+              <a:t>Ez az első héten nem működött feltétlenül a legjobban, de utána elkezdtünk ténylegesen csapatként dolgozni.</a:t>
+            </a:r>
+          </a:p>
+          <a:p>
+            <a:endParaRPr lang="hu-HU" baseline="0" dirty="0" smtClean="0"/>
+          </a:p>
+          <a:p>
+            <a:r>
+              <a:rPr lang="en-US" baseline="0" dirty="0" smtClean="0"/>
+              <a:t>(NOTE: </a:t>
+            </a:r>
+            <a:r>
+              <a:rPr lang="hu-HU" baseline="0" dirty="0" smtClean="0"/>
+              <a:t>U</a:t>
+            </a:r>
+            <a:r>
+              <a:rPr lang="en-US" baseline="0" dirty="0" err="1" smtClean="0"/>
+              <a:t>tols</a:t>
+            </a:r>
+            <a:r>
+              <a:rPr lang="hu-HU" baseline="0" dirty="0" smtClean="0"/>
+              <a:t>ót Bence is említi, csak bővebben, itt maradjon-e?</a:t>
+            </a:r>
+            <a:r>
+              <a:rPr lang="en-US" baseline="0" dirty="0" smtClean="0"/>
+              <a:t>)</a:t>
+            </a:r>
+            <a:endParaRPr lang="hu-HU" baseline="0" dirty="0" smtClean="0"/>
+          </a:p>
+          <a:p>
+            <a:endParaRPr lang="en-US" baseline="0" dirty="0" smtClean="0"/>
+          </a:p>
+          <a:p>
+            <a:r>
+              <a:rPr lang="hu-HU" noProof="0" dirty="0" smtClean="0"/>
+              <a:t>Ezt</a:t>
+            </a:r>
+            <a:r>
+              <a:rPr lang="en-US" baseline="0" dirty="0" smtClean="0"/>
+              <a:t> </a:t>
+            </a:r>
+            <a:r>
+              <a:rPr lang="hu-HU" baseline="0" noProof="0" dirty="0" smtClean="0"/>
+              <a:t>követően</a:t>
+            </a:r>
+            <a:r>
+              <a:rPr lang="hu-HU" baseline="0" dirty="0" smtClean="0"/>
+              <a:t> a fájlfeltöltés UI oldali megvalósítása volt a feladatom, ehhez kissé ódzkodva álltam hozzá, mivel a felületi megvalósítást nem tekintettem azt erősségemnek, de különösebb problémákba nem ütköztem.</a:t>
+            </a:r>
+          </a:p>
+          <a:p>
+            <a:endParaRPr lang="hu-HU" baseline="0" dirty="0" smtClean="0"/>
+          </a:p>
+          <a:p>
+            <a:r>
+              <a:rPr lang="hu-HU" baseline="0" dirty="0" smtClean="0"/>
+              <a:t>Ezek után az esemény típusok kezelése következett </a:t>
+            </a:r>
+            <a:r>
+              <a:rPr lang="hu-HU" baseline="0" dirty="0" err="1" smtClean="0"/>
+              <a:t>backend</a:t>
+            </a:r>
+            <a:r>
+              <a:rPr lang="hu-HU" baseline="0" dirty="0" smtClean="0"/>
+              <a:t> oldalon, mely eredményeként a </a:t>
+            </a:r>
+            <a:r>
+              <a:rPr lang="hu-HU" baseline="0" dirty="0" err="1" smtClean="0"/>
+              <a:t>venue</a:t>
+            </a:r>
+            <a:r>
+              <a:rPr lang="hu-HU" baseline="0" dirty="0" smtClean="0"/>
+              <a:t> tulajdonos megadhatja a létrehozni kívánt esemény típusát.</a:t>
+            </a:r>
+          </a:p>
+          <a:p>
+            <a:endParaRPr lang="hu-HU" baseline="0" dirty="0" smtClean="0"/>
+          </a:p>
+          <a:p>
+            <a:r>
+              <a:rPr lang="hu-HU" baseline="0" dirty="0" smtClean="0"/>
+              <a:t>(NOTE</a:t>
+            </a:r>
+            <a:r>
+              <a:rPr lang="en-US" baseline="0" dirty="0" smtClean="0"/>
+              <a:t>: </a:t>
+            </a:r>
+            <a:r>
+              <a:rPr lang="hu-HU" baseline="0" dirty="0" smtClean="0"/>
+              <a:t>lehet túlontúl szájbarágós a </a:t>
+            </a:r>
+            <a:r>
+              <a:rPr lang="hu-HU" baseline="0" dirty="0" err="1" smtClean="0"/>
+              <a:t>megf</a:t>
+            </a:r>
+            <a:r>
+              <a:rPr lang="hu-HU" baseline="0" dirty="0" smtClean="0"/>
+              <a:t>. az utolsó gondolatnál)</a:t>
+            </a:r>
+          </a:p>
+        </p:txBody>
+      </p:sp>
+      <p:sp>
+        <p:nvSpPr>
+          <p:cNvPr id="4" name="Dia számának helye 3"/>
+          <p:cNvSpPr>
+            <a:spLocks noGrp="1"/>
+          </p:cNvSpPr>
+          <p:nvPr>
+            <p:ph type="sldNum" sz="quarter" idx="10"/>
+          </p:nvPr>
+        </p:nvSpPr>
+        <p:spPr/>
+        <p:txBody>
+          <a:bodyPr/>
+          <a:lstStyle/>
+          <a:p>
+            <a:fld id="{9FAC7F36-1C04-4816-80C8-90F28C90A98F}" type="slidenum">
+              <a:rPr lang="hu-HU" smtClean="0"/>
+              <a:t>3</a:t>
+            </a:fld>
+            <a:endParaRPr lang="hu-HU"/>
+          </a:p>
+        </p:txBody>
+      </p:sp>
+    </p:spTree>
+    <p:extLst>
+      <p:ext uri="{BB962C8B-B14F-4D97-AF65-F5344CB8AC3E}">
+        <p14:creationId xmlns:p14="http://schemas.microsoft.com/office/powerpoint/2010/main" val="2207064539"/>
+      </p:ext>
+    </p:extLst>
+  </p:cSld>
+  <p:clrMapOvr>
+    <a:masterClrMapping/>
+  </p:clrMapOvr>
+</p:notes>
+</file>
+
+<file path=ppt/notesSlides/notesSlide4.xml><?xml version="1.0" encoding="utf-8"?>
+<p:notes xmlns:a="http://schemas.openxmlformats.org/drawingml/2006/main" xmlns:r="http://schemas.openxmlformats.org/officeDocument/2006/relationships" xmlns:p="http://schemas.openxmlformats.org/presentationml/2006/main">
+  <p:cSld>
+    <p:spTree>
+      <p:nvGrpSpPr>
+        <p:cNvPr id="1" name=""/>
+        <p:cNvGrpSpPr/>
+        <p:nvPr/>
+      </p:nvGrpSpPr>
+      <p:grpSpPr>
+        <a:xfrm>
+          <a:off x="0" y="0"/>
+          <a:ext cx="0" cy="0"/>
+          <a:chOff x="0" y="0"/>
+          <a:chExt cx="0" cy="0"/>
+        </a:xfrm>
+      </p:grpSpPr>
+      <p:sp>
+        <p:nvSpPr>
+          <p:cNvPr id="2" name="Diakép helye 1"/>
+          <p:cNvSpPr>
+            <a:spLocks noGrp="1" noRot="1" noChangeAspect="1"/>
+          </p:cNvSpPr>
+          <p:nvPr>
+            <p:ph type="sldImg"/>
+          </p:nvPr>
+        </p:nvSpPr>
+        <p:spPr/>
+      </p:sp>
+      <p:sp>
+        <p:nvSpPr>
+          <p:cNvPr id="3" name="Jegyzetek helye 2"/>
+          <p:cNvSpPr>
+            <a:spLocks noGrp="1"/>
+          </p:cNvSpPr>
+          <p:nvPr>
+            <p:ph type="body" idx="1"/>
+          </p:nvPr>
+        </p:nvSpPr>
+        <p:spPr/>
+        <p:txBody>
+          <a:bodyPr/>
+          <a:lstStyle/>
+          <a:p>
+            <a:r>
+              <a:rPr lang="hu-HU" dirty="0" smtClean="0"/>
+              <a:t>Következő feladatom szintén az eseményekhez köthető, pontosabban</a:t>
+            </a:r>
+            <a:r>
+              <a:rPr lang="hu-HU" baseline="0" dirty="0" smtClean="0"/>
+              <a:t> az eseményekhez megadható ital kedvezményekhez, melyen részben frontend és </a:t>
+            </a:r>
+            <a:r>
+              <a:rPr lang="hu-HU" baseline="0" dirty="0" err="1" smtClean="0"/>
+              <a:t>backend</a:t>
+            </a:r>
+            <a:r>
+              <a:rPr lang="hu-HU" baseline="0" dirty="0" smtClean="0"/>
+              <a:t> oldalon is dolgoztam. </a:t>
+            </a:r>
+          </a:p>
+          <a:p>
+            <a:r>
+              <a:rPr lang="en-US" baseline="0" dirty="0" smtClean="0"/>
+              <a:t>(</a:t>
+            </a:r>
+            <a:r>
+              <a:rPr lang="hu-HU" baseline="0" dirty="0" smtClean="0"/>
+              <a:t>NOTE</a:t>
+            </a:r>
+            <a:r>
+              <a:rPr lang="en-US" baseline="0" dirty="0" smtClean="0"/>
+              <a:t>: ha r</a:t>
+            </a:r>
+            <a:r>
+              <a:rPr lang="hu-HU" baseline="0" dirty="0" smtClean="0"/>
+              <a:t>övid lesz kis magyarázat</a:t>
+            </a:r>
+            <a:r>
+              <a:rPr lang="en-US" baseline="0" dirty="0" smtClean="0"/>
+              <a:t>)</a:t>
+            </a:r>
+            <a:endParaRPr lang="hu-HU" baseline="0" dirty="0" smtClean="0"/>
+          </a:p>
+          <a:p>
+            <a:endParaRPr lang="hu-HU" baseline="0" dirty="0" smtClean="0"/>
+          </a:p>
+          <a:p>
+            <a:r>
+              <a:rPr lang="hu-HU" baseline="0" dirty="0" smtClean="0"/>
+              <a:t>Az i18n-el is foglalkoztam, vagyis az </a:t>
+            </a:r>
+            <a:r>
+              <a:rPr lang="hu-HU" baseline="0" dirty="0" err="1" smtClean="0"/>
+              <a:t>internacionalizációval</a:t>
+            </a:r>
+            <a:r>
+              <a:rPr lang="hu-HU" baseline="0" dirty="0" smtClean="0"/>
+              <a:t>, többnyelvűséggel, bár ennek megvalósításán a csapat összes tagja dolgozott valamilyen formában.</a:t>
+            </a:r>
+          </a:p>
+          <a:p>
+            <a:endParaRPr lang="hu-HU" baseline="0" dirty="0" smtClean="0"/>
+          </a:p>
+          <a:p>
+            <a:r>
+              <a:rPr lang="hu-HU" baseline="0" dirty="0" smtClean="0"/>
+              <a:t>Legnagyobb saját feladatomnak az adminisztrátori oldal, adminisztrátori lehetőségek </a:t>
+            </a:r>
+            <a:r>
+              <a:rPr lang="hu-HU" dirty="0" smtClean="0"/>
+              <a:t>kivitelezését tekintem,</a:t>
+            </a:r>
+            <a:r>
+              <a:rPr lang="hu-HU" baseline="0" dirty="0" smtClean="0"/>
+              <a:t> melyet front- és </a:t>
+            </a:r>
+            <a:r>
+              <a:rPr lang="hu-HU" baseline="0" dirty="0" err="1" smtClean="0"/>
+              <a:t>backend</a:t>
+            </a:r>
+            <a:r>
+              <a:rPr lang="hu-HU" baseline="0" dirty="0" smtClean="0"/>
+              <a:t> oldalon is én csináltam. </a:t>
+            </a:r>
+          </a:p>
+          <a:p>
+            <a:r>
+              <a:rPr lang="hu-HU" baseline="0" dirty="0" smtClean="0"/>
+              <a:t>(NOTE</a:t>
+            </a:r>
+            <a:r>
+              <a:rPr lang="en-US" baseline="0" dirty="0" smtClean="0"/>
+              <a:t>: </a:t>
+            </a:r>
+            <a:r>
+              <a:rPr lang="en-US" baseline="0" dirty="0" err="1" smtClean="0"/>
+              <a:t>Lehet</a:t>
+            </a:r>
+            <a:r>
+              <a:rPr lang="en-US" baseline="0" dirty="0" smtClean="0"/>
+              <a:t> k</a:t>
+            </a:r>
+            <a:r>
+              <a:rPr lang="hu-HU" baseline="0" dirty="0" smtClean="0"/>
+              <a:t>öv. diára kellene ez a gondolat, mert hamar elmondom ami ott van és a diagramot nem tudják nézni.)</a:t>
+            </a:r>
+          </a:p>
+        </p:txBody>
+      </p:sp>
+      <p:sp>
+        <p:nvSpPr>
+          <p:cNvPr id="4" name="Dia számának helye 3"/>
+          <p:cNvSpPr>
+            <a:spLocks noGrp="1"/>
+          </p:cNvSpPr>
+          <p:nvPr>
+            <p:ph type="sldNum" sz="quarter" idx="10"/>
+          </p:nvPr>
+        </p:nvSpPr>
+        <p:spPr/>
+        <p:txBody>
+          <a:bodyPr/>
+          <a:lstStyle/>
+          <a:p>
+            <a:fld id="{9FAC7F36-1C04-4816-80C8-90F28C90A98F}" type="slidenum">
+              <a:rPr lang="hu-HU" smtClean="0"/>
+              <a:t>4</a:t>
+            </a:fld>
+            <a:endParaRPr lang="hu-HU"/>
+          </a:p>
+        </p:txBody>
+      </p:sp>
+    </p:spTree>
+    <p:extLst>
+      <p:ext uri="{BB962C8B-B14F-4D97-AF65-F5344CB8AC3E}">
+        <p14:creationId xmlns:p14="http://schemas.microsoft.com/office/powerpoint/2010/main" val="2069455747"/>
+      </p:ext>
+    </p:extLst>
+  </p:cSld>
+  <p:clrMapOvr>
+    <a:masterClrMapping/>
+  </p:clrMapOvr>
+</p:notes>
+</file>
+
+<file path=ppt/notesSlides/notesSlide5.xml><?xml version="1.0" encoding="utf-8"?>
+<p:notes xmlns:a="http://schemas.openxmlformats.org/drawingml/2006/main" xmlns:r="http://schemas.openxmlformats.org/officeDocument/2006/relationships" xmlns:p="http://schemas.openxmlformats.org/presentationml/2006/main">
+  <p:cSld>
+    <p:spTree>
+      <p:nvGrpSpPr>
+        <p:cNvPr id="1" name=""/>
+        <p:cNvGrpSpPr/>
+        <p:nvPr/>
+      </p:nvGrpSpPr>
+      <p:grpSpPr>
+        <a:xfrm>
+          <a:off x="0" y="0"/>
+          <a:ext cx="0" cy="0"/>
+          <a:chOff x="0" y="0"/>
+          <a:chExt cx="0" cy="0"/>
+        </a:xfrm>
+      </p:grpSpPr>
+      <p:sp>
+        <p:nvSpPr>
+          <p:cNvPr id="2" name="Diakép helye 1"/>
+          <p:cNvSpPr>
+            <a:spLocks noGrp="1" noRot="1" noChangeAspect="1"/>
+          </p:cNvSpPr>
+          <p:nvPr>
+            <p:ph type="sldImg"/>
+          </p:nvPr>
+        </p:nvSpPr>
+        <p:spPr/>
+      </p:sp>
+      <p:sp>
+        <p:nvSpPr>
+          <p:cNvPr id="3" name="Jegyzetek helye 2"/>
+          <p:cNvSpPr>
+            <a:spLocks noGrp="1"/>
+          </p:cNvSpPr>
+          <p:nvPr>
+            <p:ph type="body" idx="1"/>
+          </p:nvPr>
+        </p:nvSpPr>
+        <p:spPr/>
+        <p:txBody>
+          <a:bodyPr/>
+          <a:lstStyle/>
+          <a:p>
+            <a:r>
+              <a:rPr lang="hu-HU" dirty="0" smtClean="0"/>
+              <a:t>Ennek során</a:t>
+            </a:r>
+            <a:r>
+              <a:rPr lang="hu-HU" baseline="0" dirty="0" smtClean="0"/>
+              <a:t> a </a:t>
+            </a:r>
+            <a:r>
+              <a:rPr lang="hu-HU" baseline="0" dirty="0" err="1" smtClean="0"/>
+              <a:t>Landingtől</a:t>
+            </a:r>
+            <a:r>
+              <a:rPr lang="hu-HU" baseline="0" dirty="0" smtClean="0"/>
+              <a:t> kapott felhasználó jogkörének megfelelő lehetőséget kap arra, hogy a </a:t>
+            </a:r>
+            <a:r>
+              <a:rPr lang="hu-HU" baseline="0" dirty="0" err="1" smtClean="0"/>
+              <a:t>venue</a:t>
+            </a:r>
+            <a:r>
+              <a:rPr lang="hu-HU" baseline="0" dirty="0" smtClean="0"/>
+              <a:t> profilokat listázhassa, esetlegesen zárolhassa, ekkor a  tulajdonos saját profilján értesítést kap a zárolásról, ennek okáról, a profil külső szemlélő részére pedig nem elérhető.</a:t>
+            </a:r>
+          </a:p>
+          <a:p>
+            <a:endParaRPr lang="hu-HU" baseline="0" dirty="0" smtClean="0"/>
+          </a:p>
+          <a:p>
+            <a:r>
+              <a:rPr lang="hu-HU" baseline="0" dirty="0" smtClean="0"/>
+              <a:t>A dián látható diagram a különböző profilmegjelenítési lehetőségeket hivatott szemléltetni.</a:t>
+            </a:r>
+          </a:p>
+          <a:p>
+            <a:endParaRPr lang="hu-HU" dirty="0"/>
+          </a:p>
+        </p:txBody>
+      </p:sp>
+      <p:sp>
+        <p:nvSpPr>
+          <p:cNvPr id="4" name="Dia számának helye 3"/>
+          <p:cNvSpPr>
+            <a:spLocks noGrp="1"/>
+          </p:cNvSpPr>
+          <p:nvPr>
+            <p:ph type="sldNum" sz="quarter" idx="10"/>
+          </p:nvPr>
+        </p:nvSpPr>
+        <p:spPr/>
+        <p:txBody>
+          <a:bodyPr/>
+          <a:lstStyle/>
+          <a:p>
+            <a:fld id="{9FAC7F36-1C04-4816-80C8-90F28C90A98F}" type="slidenum">
+              <a:rPr lang="hu-HU" smtClean="0"/>
+              <a:t>5</a:t>
+            </a:fld>
+            <a:endParaRPr lang="hu-HU"/>
+          </a:p>
+        </p:txBody>
+      </p:sp>
+    </p:spTree>
+    <p:extLst>
+      <p:ext uri="{BB962C8B-B14F-4D97-AF65-F5344CB8AC3E}">
+        <p14:creationId xmlns:p14="http://schemas.microsoft.com/office/powerpoint/2010/main" val="1071483233"/>
+      </p:ext>
+    </p:extLst>
+  </p:cSld>
+  <p:clrMapOvr>
+    <a:masterClrMapping/>
+  </p:clrMapOvr>
+</p:notes>
+</file>
+
+<file path=ppt/notesSlides/notesSlide6.xml><?xml version="1.0" encoding="utf-8"?>
+<p:notes xmlns:a="http://schemas.openxmlformats.org/drawingml/2006/main" xmlns:r="http://schemas.openxmlformats.org/officeDocument/2006/relationships" xmlns:p="http://schemas.openxmlformats.org/presentationml/2006/main">
+  <p:cSld>
+    <p:spTree>
+      <p:nvGrpSpPr>
+        <p:cNvPr id="1" name=""/>
+        <p:cNvGrpSpPr/>
+        <p:nvPr/>
+      </p:nvGrpSpPr>
+      <p:grpSpPr>
+        <a:xfrm>
+          <a:off x="0" y="0"/>
+          <a:ext cx="0" cy="0"/>
+          <a:chOff x="0" y="0"/>
+          <a:chExt cx="0" cy="0"/>
+        </a:xfrm>
+      </p:grpSpPr>
+      <p:sp>
+        <p:nvSpPr>
+          <p:cNvPr id="2" name="Diakép helye 1"/>
+          <p:cNvSpPr>
+            <a:spLocks noGrp="1" noRot="1" noChangeAspect="1"/>
+          </p:cNvSpPr>
+          <p:nvPr>
+            <p:ph type="sldImg"/>
+          </p:nvPr>
+        </p:nvSpPr>
+        <p:spPr/>
+      </p:sp>
+      <p:sp>
+        <p:nvSpPr>
+          <p:cNvPr id="3" name="Jegyzetek helye 2"/>
+          <p:cNvSpPr>
+            <a:spLocks noGrp="1"/>
+          </p:cNvSpPr>
+          <p:nvPr>
+            <p:ph type="body" idx="1"/>
+          </p:nvPr>
+        </p:nvSpPr>
+        <p:spPr/>
+        <p:txBody>
+          <a:bodyPr/>
+          <a:lstStyle/>
+          <a:p>
+            <a:r>
+              <a:rPr lang="hu-HU" dirty="0" smtClean="0"/>
+              <a:t>Mindent</a:t>
+            </a:r>
+            <a:r>
+              <a:rPr lang="hu-HU" baseline="0" dirty="0" smtClean="0"/>
+              <a:t> összevetve mind a képzés mind a projektmunka jó hangulatban telt, </a:t>
+            </a:r>
+          </a:p>
+          <a:p>
+            <a:r>
+              <a:rPr lang="hu-HU" baseline="0" dirty="0" smtClean="0"/>
+              <a:t>kiemelném a csapatmunkát, mint sokaknak az előttem szólók közül nekem új és pozitív dolog volt,</a:t>
+            </a:r>
+          </a:p>
+          <a:p>
+            <a:r>
+              <a:rPr lang="hu-HU" baseline="0" dirty="0" smtClean="0"/>
+              <a:t>Szakmailag a 2?3 hónap során rengeteget fejlődtem, és rengeteg új technológiát is megismertem.</a:t>
+            </a:r>
+          </a:p>
+          <a:p>
+            <a:r>
+              <a:rPr lang="hu-HU" baseline="0" dirty="0" smtClean="0"/>
+              <a:t>Köszönöm a figyelmet.</a:t>
+            </a:r>
+            <a:endParaRPr lang="hu-HU" dirty="0"/>
+          </a:p>
+        </p:txBody>
+      </p:sp>
+      <p:sp>
+        <p:nvSpPr>
+          <p:cNvPr id="4" name="Dia számának helye 3"/>
+          <p:cNvSpPr>
+            <a:spLocks noGrp="1"/>
+          </p:cNvSpPr>
+          <p:nvPr>
+            <p:ph type="sldNum" sz="quarter" idx="10"/>
+          </p:nvPr>
+        </p:nvSpPr>
+        <p:spPr/>
+        <p:txBody>
+          <a:bodyPr/>
+          <a:lstStyle/>
+          <a:p>
+            <a:fld id="{9FAC7F36-1C04-4816-80C8-90F28C90A98F}" type="slidenum">
+              <a:rPr lang="hu-HU" smtClean="0"/>
+              <a:t>6</a:t>
+            </a:fld>
+            <a:endParaRPr lang="hu-HU"/>
+          </a:p>
+        </p:txBody>
+      </p:sp>
+    </p:spTree>
+    <p:extLst>
+      <p:ext uri="{BB962C8B-B14F-4D97-AF65-F5344CB8AC3E}">
+        <p14:creationId xmlns:p14="http://schemas.microsoft.com/office/powerpoint/2010/main" val="2818825815"/>
+      </p:ext>
+    </p:extLst>
+  </p:cSld>
+  <p:clrMapOvr>
+    <a:masterClrMapping/>
+  </p:clrMapOvr>
+</p:notes>
+</file>
+
 <file path=ppt/slideLayouts/slideLayout1.xml><?xml version="1.0" encoding="utf-8"?>
 <p:sldLayout xmlns:a="http://schemas.openxmlformats.org/drawingml/2006/main" xmlns:r="http://schemas.openxmlformats.org/officeDocument/2006/relationships" xmlns:p="http://schemas.openxmlformats.org/presentationml/2006/main" type="title" preserve="1">
   <p:cSld name="Címdia">
@@ -260,7 +1472,7 @@
           <a:p>
             <a:fld id="{C6E8B002-83F0-41C5-A7B7-2819A96BD9B2}" type="datetimeFigureOut">
               <a:rPr lang="hu-HU" smtClean="0"/>
-              <a:t>2016. 09. 30.</a:t>
+              <a:t>2016. 10. 03.</a:t>
             </a:fld>
             <a:endParaRPr lang="hu-HU"/>
           </a:p>
@@ -430,7 +1642,7 @@
           <a:p>
             <a:fld id="{C6E8B002-83F0-41C5-A7B7-2819A96BD9B2}" type="datetimeFigureOut">
               <a:rPr lang="hu-HU" smtClean="0"/>
-              <a:t>2016. 09. 30.</a:t>
+              <a:t>2016. 10. 03.</a:t>
             </a:fld>
             <a:endParaRPr lang="hu-HU"/>
           </a:p>
@@ -610,7 +1822,7 @@
           <a:p>
             <a:fld id="{C6E8B002-83F0-41C5-A7B7-2819A96BD9B2}" type="datetimeFigureOut">
               <a:rPr lang="hu-HU" smtClean="0"/>
-              <a:t>2016. 09. 30.</a:t>
+              <a:t>2016. 10. 03.</a:t>
             </a:fld>
             <a:endParaRPr lang="hu-HU"/>
           </a:p>
@@ -780,7 +1992,7 @@
           <a:p>
             <a:fld id="{C6E8B002-83F0-41C5-A7B7-2819A96BD9B2}" type="datetimeFigureOut">
               <a:rPr lang="hu-HU" smtClean="0"/>
-              <a:t>2016. 09. 30.</a:t>
+              <a:t>2016. 10. 03.</a:t>
             </a:fld>
             <a:endParaRPr lang="hu-HU"/>
           </a:p>
@@ -1024,7 +2236,7 @@
           <a:p>
             <a:fld id="{C6E8B002-83F0-41C5-A7B7-2819A96BD9B2}" type="datetimeFigureOut">
               <a:rPr lang="hu-HU" smtClean="0"/>
-              <a:t>2016. 09. 30.</a:t>
+              <a:t>2016. 10. 03.</a:t>
             </a:fld>
             <a:endParaRPr lang="hu-HU"/>
           </a:p>
@@ -1256,7 +2468,7 @@
           <a:p>
             <a:fld id="{C6E8B002-83F0-41C5-A7B7-2819A96BD9B2}" type="datetimeFigureOut">
               <a:rPr lang="hu-HU" smtClean="0"/>
-              <a:t>2016. 09. 30.</a:t>
+              <a:t>2016. 10. 03.</a:t>
             </a:fld>
             <a:endParaRPr lang="hu-HU"/>
           </a:p>
@@ -1623,7 +2835,7 @@
           <a:p>
             <a:fld id="{C6E8B002-83F0-41C5-A7B7-2819A96BD9B2}" type="datetimeFigureOut">
               <a:rPr lang="hu-HU" smtClean="0"/>
-              <a:t>2016. 09. 30.</a:t>
+              <a:t>2016. 10. 03.</a:t>
             </a:fld>
             <a:endParaRPr lang="hu-HU"/>
           </a:p>
@@ -1741,7 +2953,7 @@
           <a:p>
             <a:fld id="{C6E8B002-83F0-41C5-A7B7-2819A96BD9B2}" type="datetimeFigureOut">
               <a:rPr lang="hu-HU" smtClean="0"/>
-              <a:t>2016. 09. 30.</a:t>
+              <a:t>2016. 10. 03.</a:t>
             </a:fld>
             <a:endParaRPr lang="hu-HU"/>
           </a:p>
@@ -1836,7 +3048,7 @@
           <a:p>
             <a:fld id="{C6E8B002-83F0-41C5-A7B7-2819A96BD9B2}" type="datetimeFigureOut">
               <a:rPr lang="hu-HU" smtClean="0"/>
-              <a:t>2016. 09. 30.</a:t>
+              <a:t>2016. 10. 03.</a:t>
             </a:fld>
             <a:endParaRPr lang="hu-HU"/>
           </a:p>
@@ -2113,7 +3325,7 @@
           <a:p>
             <a:fld id="{C6E8B002-83F0-41C5-A7B7-2819A96BD9B2}" type="datetimeFigureOut">
               <a:rPr lang="hu-HU" smtClean="0"/>
-              <a:t>2016. 09. 30.</a:t>
+              <a:t>2016. 10. 03.</a:t>
             </a:fld>
             <a:endParaRPr lang="hu-HU"/>
           </a:p>
@@ -2370,7 +3582,7 @@
           <a:p>
             <a:fld id="{C6E8B002-83F0-41C5-A7B7-2819A96BD9B2}" type="datetimeFigureOut">
               <a:rPr lang="hu-HU" smtClean="0"/>
-              <a:t>2016. 09. 30.</a:t>
+              <a:t>2016. 10. 03.</a:t>
             </a:fld>
             <a:endParaRPr lang="hu-HU"/>
           </a:p>
@@ -2590,7 +3802,7 @@
           <a:p>
             <a:fld id="{C6E8B002-83F0-41C5-A7B7-2819A96BD9B2}" type="datetimeFigureOut">
               <a:rPr lang="hu-HU" smtClean="0"/>
-              <a:t>2016. 09. 30.</a:t>
+              <a:t>2016. 10. 03.</a:t>
             </a:fld>
             <a:endParaRPr lang="hu-HU"/>
           </a:p>
@@ -2984,7 +4196,7 @@
     <p:bg>
       <p:bgPr>
         <a:blipFill dpi="0" rotWithShape="1">
-          <a:blip r:embed="rId2"/>
+          <a:blip r:embed="rId3"/>
           <a:srcRect/>
           <a:stretch>
             <a:fillRect/>
@@ -3154,7 +4366,7 @@
           <p:nvPr/>
         </p:nvPicPr>
         <p:blipFill>
-          <a:blip r:embed="rId2" cstate="print">
+          <a:blip r:embed="rId3" cstate="print">
             <a:extLst>
               <a:ext uri="{28A0092B-C50C-407E-A947-70E740481C1C}">
                 <a14:useLocalDpi xmlns:a14="http://schemas.microsoft.com/office/drawing/2010/main" val="0"/>
@@ -3167,7 +4379,7 @@
         </p:blipFill>
         <p:spPr>
           <a:xfrm>
-            <a:off x="5037992" y="1175949"/>
+            <a:off x="4791808" y="1175949"/>
             <a:ext cx="2103754" cy="3167451"/>
           </a:xfrm>
           <a:prstGeom prst="rect">
@@ -3269,39 +4481,63 @@
           <a:lstStyle/>
           <a:p>
             <a:r>
+              <a:rPr lang="hu-HU" sz="2400" dirty="0">
+                <a:latin typeface="+mj-lt"/>
+              </a:rPr>
+              <a:t>Service és </a:t>
+            </a:r>
+            <a:r>
+              <a:rPr lang="hu-HU" sz="2400" dirty="0" err="1">
+                <a:latin typeface="+mj-lt"/>
+              </a:rPr>
+              <a:t>Vo</a:t>
+            </a:r>
+            <a:r>
+              <a:rPr lang="hu-HU" sz="2400" dirty="0">
+                <a:latin typeface="+mj-lt"/>
+              </a:rPr>
+              <a:t> </a:t>
+            </a:r>
+            <a:r>
               <a:rPr lang="hu-HU" sz="2400" dirty="0" smtClean="0">
                 <a:latin typeface="+mj-lt"/>
               </a:rPr>
-              <a:t>Fájlfeltöltés megvalósítása</a:t>
-            </a:r>
+              <a:t>réteg</a:t>
+            </a:r>
+            <a:endParaRPr lang="hu-HU" sz="2400" dirty="0" smtClean="0">
+              <a:latin typeface="+mj-lt"/>
+            </a:endParaRPr>
           </a:p>
           <a:p>
             <a:r>
               <a:rPr lang="hu-HU" sz="2400" dirty="0" smtClean="0">
                 <a:latin typeface="+mj-lt"/>
               </a:rPr>
-              <a:t>Esemény típus kezelése</a:t>
-            </a:r>
-          </a:p>
-          <a:p>
+              <a:t>Fájlfeltöltés </a:t>
+            </a:r>
             <a:r>
               <a:rPr lang="hu-HU" sz="2400" dirty="0" smtClean="0">
                 <a:latin typeface="+mj-lt"/>
               </a:rPr>
-              <a:t>Service és </a:t>
-            </a:r>
-            <a:r>
-              <a:rPr lang="hu-HU" sz="2400" dirty="0" err="1" smtClean="0">
-                <a:latin typeface="+mj-lt"/>
-              </a:rPr>
-              <a:t>Vo</a:t>
-            </a:r>
+              <a:t>megvalósítása</a:t>
+            </a:r>
+          </a:p>
+          <a:p>
             <a:r>
               <a:rPr lang="hu-HU" sz="2400" dirty="0" smtClean="0">
                 <a:latin typeface="+mj-lt"/>
               </a:rPr>
-              <a:t> réteg</a:t>
-            </a:r>
+              <a:t>Esemény típus </a:t>
+            </a:r>
+            <a:r>
+              <a:rPr lang="hu-HU" sz="2400" dirty="0" smtClean="0">
+                <a:latin typeface="+mj-lt"/>
+              </a:rPr>
+              <a:t>kezelése</a:t>
+            </a:r>
+            <a:endParaRPr lang="hu-HU" sz="2400" dirty="0" smtClean="0">
+              <a:latin typeface="+mj-lt"/>
+            </a:endParaRPr>
           </a:p>
         </p:txBody>
       </p:sp>
@@ -3314,7 +4550,7 @@
           <p:nvPr/>
         </p:nvPicPr>
         <p:blipFill>
-          <a:blip r:embed="rId2">
+          <a:blip r:embed="rId3">
             <a:extLst>
               <a:ext uri="{28A0092B-C50C-407E-A947-70E740481C1C}">
                 <a14:useLocalDpi xmlns:a14="http://schemas.microsoft.com/office/drawing/2010/main" val="0"/>
@@ -3440,16 +4676,24 @@
               <a:rPr lang="hu-HU" sz="2400" dirty="0" smtClean="0">
                 <a:latin typeface="+mj-lt"/>
               </a:rPr>
-              <a:t>Adminisztrátor felület</a:t>
-            </a:r>
-          </a:p>
-          <a:p>
-            <a:r>
-              <a:rPr lang="hu-HU" sz="2400" dirty="0" smtClean="0">
+              <a:t>I18n</a:t>
+            </a:r>
+            <a:endParaRPr lang="en-US" sz="2400" dirty="0" smtClean="0">
+              <a:latin typeface="+mj-lt"/>
+            </a:endParaRPr>
+          </a:p>
+          <a:p>
+            <a:r>
+              <a:rPr lang="hu-HU" sz="2400" dirty="0">
                 <a:latin typeface="+mj-lt"/>
               </a:rPr>
-              <a:t>i18n</a:t>
-            </a:r>
+              <a:t>Adminisztrátor felület</a:t>
+            </a:r>
+          </a:p>
+          <a:p>
+            <a:endParaRPr lang="hu-HU" sz="2400" dirty="0" smtClean="0">
+              <a:latin typeface="+mj-lt"/>
+            </a:endParaRPr>
           </a:p>
         </p:txBody>
       </p:sp>
@@ -3462,7 +4706,7 @@
           <p:nvPr/>
         </p:nvPicPr>
         <p:blipFill>
-          <a:blip r:embed="rId2">
+          <a:blip r:embed="rId3">
             <a:extLst>
               <a:ext uri="{28A0092B-C50C-407E-A947-70E740481C1C}">
                 <a14:useLocalDpi xmlns:a14="http://schemas.microsoft.com/office/drawing/2010/main" val="0"/>
@@ -3565,7 +4809,7 @@
           </p:nvPr>
         </p:nvPicPr>
         <p:blipFill>
-          <a:blip r:embed="rId2">
+          <a:blip r:embed="rId3">
             <a:extLst>
               <a:ext uri="{28A0092B-C50C-407E-A947-70E740481C1C}">
                 <a14:useLocalDpi xmlns:a14="http://schemas.microsoft.com/office/drawing/2010/main" val="0"/>
@@ -3674,6 +4918,31 @@
           <a:lstStyle/>
           <a:p>
             <a:r>
+              <a:rPr lang="hu-HU" sz="2400" dirty="0" smtClean="0">
+                <a:latin typeface="+mj-lt"/>
+              </a:rPr>
+              <a:t>Jó </a:t>
+            </a:r>
+            <a:r>
+              <a:rPr lang="hu-HU" sz="2400" dirty="0" smtClean="0">
+                <a:latin typeface="+mj-lt"/>
+              </a:rPr>
+              <a:t>hangulat</a:t>
+            </a:r>
+            <a:endParaRPr lang="hu-HU" sz="2400" dirty="0">
+              <a:latin typeface="+mj-lt"/>
+            </a:endParaRPr>
+          </a:p>
+          <a:p>
+            <a:r>
+              <a:rPr lang="hu-HU" sz="2400" dirty="0" smtClean="0">
+                <a:latin typeface="+mj-lt"/>
+              </a:rPr>
+              <a:t>Csapatmunka</a:t>
+            </a:r>
+          </a:p>
+          <a:p>
+            <a:r>
               <a:rPr lang="hu-HU" sz="2400" dirty="0">
                 <a:latin typeface="+mj-lt"/>
               </a:rPr>
@@ -3685,25 +4954,9 @@
               </a:rPr>
               <a:t>fejlődés</a:t>
             </a:r>
-          </a:p>
-          <a:p>
-            <a:r>
-              <a:rPr lang="hu-HU" sz="2400" dirty="0" smtClean="0">
-                <a:latin typeface="+mj-lt"/>
-              </a:rPr>
-              <a:t>Jó hangulat</a:t>
-            </a:r>
             <a:endParaRPr lang="hu-HU" sz="2400" dirty="0">
               <a:latin typeface="+mj-lt"/>
             </a:endParaRPr>
-          </a:p>
-          <a:p>
-            <a:r>
-              <a:rPr lang="hu-HU" sz="2400" dirty="0">
-                <a:latin typeface="+mj-lt"/>
-              </a:rPr>
-              <a:t>Csapatmunka</a:t>
-            </a:r>
           </a:p>
           <a:p>
             <a:r>
@@ -3724,7 +4977,7 @@
           <p:nvPr/>
         </p:nvPicPr>
         <p:blipFill>
-          <a:blip r:embed="rId2" cstate="print">
+          <a:blip r:embed="rId3" cstate="print">
             <a:extLst>
               <a:ext uri="{28A0092B-C50C-407E-A947-70E740481C1C}">
                 <a14:useLocalDpi xmlns:a14="http://schemas.microsoft.com/office/drawing/2010/main" val="0"/>
@@ -4299,6 +5552,291 @@
 </a:theme>
 </file>
 
+<file path=ppt/theme/theme2.xml><?xml version="1.0" encoding="utf-8"?>
+<a:theme xmlns:a="http://schemas.openxmlformats.org/drawingml/2006/main" name="Office-téma">
+  <a:themeElements>
+    <a:clrScheme name="Office">
+      <a:dk1>
+        <a:sysClr val="windowText" lastClr="000000"/>
+      </a:dk1>
+      <a:lt1>
+        <a:sysClr val="window" lastClr="FFFFFF"/>
+      </a:lt1>
+      <a:dk2>
+        <a:srgbClr val="1F497D"/>
+      </a:dk2>
+      <a:lt2>
+        <a:srgbClr val="EEECE1"/>
+      </a:lt2>
+      <a:accent1>
+        <a:srgbClr val="4F81BD"/>
+      </a:accent1>
+      <a:accent2>
+        <a:srgbClr val="C0504D"/>
+      </a:accent2>
+      <a:accent3>
+        <a:srgbClr val="9BBB59"/>
+      </a:accent3>
+      <a:accent4>
+        <a:srgbClr val="8064A2"/>
+      </a:accent4>
+      <a:accent5>
+        <a:srgbClr val="4BACC6"/>
+      </a:accent5>
+      <a:accent6>
+        <a:srgbClr val="F79646"/>
+      </a:accent6>
+      <a:hlink>
+        <a:srgbClr val="0000FF"/>
+      </a:hlink>
+      <a:folHlink>
+        <a:srgbClr val="800080"/>
+      </a:folHlink>
+    </a:clrScheme>
+    <a:fontScheme name="Office">
+      <a:majorFont>
+        <a:latin typeface="Calibri"/>
+        <a:ea typeface=""/>
+        <a:cs typeface=""/>
+        <a:font script="Jpan" typeface="ＭＳ Ｐゴシック"/>
+        <a:font script="Hang" typeface="맑은 고딕"/>
+        <a:font script="Hans" typeface="宋体"/>
+        <a:font script="Hant" typeface="新細明體"/>
+        <a:font script="Arab" typeface="Times New Roman"/>
+        <a:font script="Hebr" typeface="Times New Roman"/>
+        <a:font script="Thai" typeface="Angsana New"/>
+        <a:font script="Ethi" typeface="Nyala"/>
+        <a:font script="Beng" typeface="Vrinda"/>
+        <a:font script="Gujr" typeface="Shruti"/>
+        <a:font script="Khmr" typeface="MoolBoran"/>
+        <a:font script="Knda" typeface="Tunga"/>
+        <a:font script="Guru" typeface="Raavi"/>
+        <a:font script="Cans" typeface="Euphemia"/>
+        <a:font script="Cher" typeface="Plantagenet Cherokee"/>
+        <a:font script="Yiii" typeface="Microsoft Yi Baiti"/>
+        <a:font script="Tibt" typeface="Microsoft Himalaya"/>
+        <a:font script="Thaa" typeface="MV Boli"/>
+        <a:font script="Deva" typeface="Mangal"/>
+        <a:font script="Telu" typeface="Gautami"/>
+        <a:font script="Taml" typeface="Latha"/>
+        <a:font script="Syrc" typeface="Estrangelo Edessa"/>
+        <a:font script="Orya" typeface="Kalinga"/>
+        <a:font script="Mlym" typeface="Kartika"/>
+        <a:font script="Laoo" typeface="DokChampa"/>
+        <a:font script="Sinh" typeface="Iskoola Pota"/>
+        <a:font script="Mong" typeface="Mongolian Baiti"/>
+        <a:font script="Viet" typeface="Times New Roman"/>
+        <a:font script="Uigh" typeface="Microsoft Uighur"/>
+        <a:font script="Geor" typeface="Sylfaen"/>
+      </a:majorFont>
+      <a:minorFont>
+        <a:latin typeface="Calibri"/>
+        <a:ea typeface=""/>
+        <a:cs typeface=""/>
+        <a:font script="Jpan" typeface="ＭＳ Ｐゴシック"/>
+        <a:font script="Hang" typeface="맑은 고딕"/>
+        <a:font script="Hans" typeface="宋体"/>
+        <a:font script="Hant" typeface="新細明體"/>
+        <a:font script="Arab" typeface="Arial"/>
+        <a:font script="Hebr" typeface="Arial"/>
+        <a:font script="Thai" typeface="Cordia New"/>
+        <a:font script="Ethi" typeface="Nyala"/>
+        <a:font script="Beng" typeface="Vrinda"/>
+        <a:font script="Gujr" typeface="Shruti"/>
+        <a:font script="Khmr" typeface="DaunPenh"/>
+        <a:font script="Knda" typeface="Tunga"/>
+        <a:font script="Guru" typeface="Raavi"/>
+        <a:font script="Cans" typeface="Euphemia"/>
+        <a:font script="Cher" typeface="Plantagenet Cherokee"/>
+        <a:font script="Yiii" typeface="Microsoft Yi Baiti"/>
+        <a:font script="Tibt" typeface="Microsoft Himalaya"/>
+        <a:font script="Thaa" typeface="MV Boli"/>
+        <a:font script="Deva" typeface="Mangal"/>
+        <a:font script="Telu" typeface="Gautami"/>
+        <a:font script="Taml" typeface="Latha"/>
+        <a:font script="Syrc" typeface="Estrangelo Edessa"/>
+        <a:font script="Orya" typeface="Kalinga"/>
+        <a:font script="Mlym" typeface="Kartika"/>
+        <a:font script="Laoo" typeface="DokChampa"/>
+        <a:font script="Sinh" typeface="Iskoola Pota"/>
+        <a:font script="Mong" typeface="Mongolian Baiti"/>
+        <a:font script="Viet" typeface="Arial"/>
+        <a:font script="Uigh" typeface="Microsoft Uighur"/>
+        <a:font script="Geor" typeface="Sylfaen"/>
+      </a:minorFont>
+    </a:fontScheme>
+    <a:fmtScheme name="Office">
+      <a:fillStyleLst>
+        <a:solidFill>
+          <a:schemeClr val="phClr"/>
+        </a:solidFill>
+        <a:gradFill rotWithShape="1">
+          <a:gsLst>
+            <a:gs pos="0">
+              <a:schemeClr val="phClr">
+                <a:tint val="50000"/>
+                <a:satMod val="300000"/>
+              </a:schemeClr>
+            </a:gs>
+            <a:gs pos="35000">
+              <a:schemeClr val="phClr">
+                <a:tint val="37000"/>
+                <a:satMod val="300000"/>
+              </a:schemeClr>
+            </a:gs>
+            <a:gs pos="100000">
+              <a:schemeClr val="phClr">
+                <a:tint val="15000"/>
+                <a:satMod val="350000"/>
+              </a:schemeClr>
+            </a:gs>
+          </a:gsLst>
+          <a:lin ang="16200000" scaled="1"/>
+        </a:gradFill>
+        <a:gradFill rotWithShape="1">
+          <a:gsLst>
+            <a:gs pos="0">
+              <a:schemeClr val="phClr">
+                <a:shade val="51000"/>
+                <a:satMod val="130000"/>
+              </a:schemeClr>
+            </a:gs>
+            <a:gs pos="80000">
+              <a:schemeClr val="phClr">
+                <a:shade val="93000"/>
+                <a:satMod val="130000"/>
+              </a:schemeClr>
+            </a:gs>
+            <a:gs pos="100000">
+              <a:schemeClr val="phClr">
+                <a:shade val="94000"/>
+                <a:satMod val="135000"/>
+              </a:schemeClr>
+            </a:gs>
+          </a:gsLst>
+          <a:lin ang="16200000" scaled="0"/>
+        </a:gradFill>
+      </a:fillStyleLst>
+      <a:lnStyleLst>
+        <a:ln w="9525" cap="flat" cmpd="sng" algn="ctr">
+          <a:solidFill>
+            <a:schemeClr val="phClr">
+              <a:shade val="95000"/>
+              <a:satMod val="105000"/>
+            </a:schemeClr>
+          </a:solidFill>
+          <a:prstDash val="solid"/>
+        </a:ln>
+        <a:ln w="25400" cap="flat" cmpd="sng" algn="ctr">
+          <a:solidFill>
+            <a:schemeClr val="phClr"/>
+          </a:solidFill>
+          <a:prstDash val="solid"/>
+        </a:ln>
+        <a:ln w="38100" cap="flat" cmpd="sng" algn="ctr">
+          <a:solidFill>
+            <a:schemeClr val="phClr"/>
+          </a:solidFill>
+          <a:prstDash val="solid"/>
+        </a:ln>
+      </a:lnStyleLst>
+      <a:effectStyleLst>
+        <a:effectStyle>
+          <a:effectLst>
+            <a:outerShdw blurRad="40000" dist="20000" dir="5400000" rotWithShape="0">
+              <a:srgbClr val="000000">
+                <a:alpha val="38000"/>
+              </a:srgbClr>
+            </a:outerShdw>
+          </a:effectLst>
+        </a:effectStyle>
+        <a:effectStyle>
+          <a:effectLst>
+            <a:outerShdw blurRad="40000" dist="23000" dir="5400000" rotWithShape="0">
+              <a:srgbClr val="000000">
+                <a:alpha val="35000"/>
+              </a:srgbClr>
+            </a:outerShdw>
+          </a:effectLst>
+        </a:effectStyle>
+        <a:effectStyle>
+          <a:effectLst>
+            <a:outerShdw blurRad="40000" dist="23000" dir="5400000" rotWithShape="0">
+              <a:srgbClr val="000000">
+                <a:alpha val="35000"/>
+              </a:srgbClr>
+            </a:outerShdw>
+          </a:effectLst>
+          <a:scene3d>
+            <a:camera prst="orthographicFront">
+              <a:rot lat="0" lon="0" rev="0"/>
+            </a:camera>
+            <a:lightRig rig="threePt" dir="t">
+              <a:rot lat="0" lon="0" rev="1200000"/>
+            </a:lightRig>
+          </a:scene3d>
+          <a:sp3d>
+            <a:bevelT w="63500" h="25400"/>
+          </a:sp3d>
+        </a:effectStyle>
+      </a:effectStyleLst>
+      <a:bgFillStyleLst>
+        <a:solidFill>
+          <a:schemeClr val="phClr"/>
+        </a:solidFill>
+        <a:gradFill rotWithShape="1">
+          <a:gsLst>
+            <a:gs pos="0">
+              <a:schemeClr val="phClr">
+                <a:tint val="40000"/>
+                <a:satMod val="350000"/>
+              </a:schemeClr>
+            </a:gs>
+            <a:gs pos="40000">
+              <a:schemeClr val="phClr">
+                <a:tint val="45000"/>
+                <a:shade val="99000"/>
+                <a:satMod val="350000"/>
+              </a:schemeClr>
+            </a:gs>
+            <a:gs pos="100000">
+              <a:schemeClr val="phClr">
+                <a:shade val="20000"/>
+                <a:satMod val="255000"/>
+              </a:schemeClr>
+            </a:gs>
+          </a:gsLst>
+          <a:path path="circle">
+            <a:fillToRect l="50000" t="-80000" r="50000" b="180000"/>
+          </a:path>
+        </a:gradFill>
+        <a:gradFill rotWithShape="1">
+          <a:gsLst>
+            <a:gs pos="0">
+              <a:schemeClr val="phClr">
+                <a:tint val="80000"/>
+                <a:satMod val="300000"/>
+              </a:schemeClr>
+            </a:gs>
+            <a:gs pos="100000">
+              <a:schemeClr val="phClr">
+                <a:shade val="30000"/>
+                <a:satMod val="200000"/>
+              </a:schemeClr>
+            </a:gs>
+          </a:gsLst>
+          <a:path path="circle">
+            <a:fillToRect l="50000" t="50000" r="50000" b="50000"/>
+          </a:path>
+        </a:gradFill>
+      </a:bgFillStyleLst>
+    </a:fmtScheme>
+  </a:themeElements>
+  <a:objectDefaults/>
+  <a:extraClrSchemeLst/>
+</a:theme>
+</file>
+
 <file path=customXml/item1.xml><?xml version="1.0" encoding="utf-8"?>
 <p:properties xmlns:p="http://schemas.microsoft.com/office/2006/metadata/properties" xmlns:xsi="http://www.w3.org/2001/XMLSchema-instance" xmlns:pc="http://schemas.microsoft.com/office/infopath/2007/PartnerControls">
   <documentManagement/>
@@ -4465,8 +6003,15 @@
 <file path=customXml/itemProps1.xml><?xml version="1.0" encoding="utf-8"?>
 <ds:datastoreItem xmlns:ds="http://schemas.openxmlformats.org/officeDocument/2006/customXml" ds:itemID="{8E1455B4-EFFE-4AEE-ADC2-FE51D16F6234}">
   <ds:schemaRefs>
+    <ds:schemaRef ds:uri="http://purl.org/dc/dcmitype/"/>
     <ds:schemaRef ds:uri="http://schemas.microsoft.com/office/2006/metadata/properties"/>
+    <ds:schemaRef ds:uri="http://schemas.openxmlformats.org/package/2006/metadata/core-properties"/>
+    <ds:schemaRef ds:uri="http://purl.org/dc/elements/1.1/"/>
     <ds:schemaRef ds:uri="http://schemas.microsoft.com/office/infopath/2007/PartnerControls"/>
+    <ds:schemaRef ds:uri="http://www.w3.org/XML/1998/namespace"/>
+    <ds:schemaRef ds:uri="http://schemas.microsoft.com/office/2006/documentManagement/types"/>
+    <ds:schemaRef ds:uri="http://purl.org/dc/terms/"/>
+    <ds:schemaRef ds:uri="9a324a02-be43-499b-8089-7896e70993e7"/>
   </ds:schemaRefs>
 </ds:datastoreItem>
 </file>

</xml_diff>